<commit_message>
update of Interactive presentation and material
</commit_message>
<xml_diff>
--- a/Interactive_jobs/Baskerville-Interactive-jobs.pptx
+++ b/Interactive_jobs/Baskerville-Interactive-jobs.pptx
@@ -21,9 +21,9 @@
     <p:sldId id="288" r:id="rId18"/>
     <p:sldId id="277" r:id="rId19"/>
     <p:sldId id="291" r:id="rId20"/>
-    <p:sldId id="293" r:id="rId21"/>
-    <p:sldId id="292" r:id="rId22"/>
-    <p:sldId id="294" r:id="rId23"/>
+    <p:sldId id="292" r:id="rId21"/>
+    <p:sldId id="294" r:id="rId22"/>
+    <p:sldId id="293" r:id="rId23"/>
     <p:sldId id="296" r:id="rId24"/>
     <p:sldId id="297" r:id="rId25"/>
     <p:sldId id="295" r:id="rId26"/>
@@ -338,7 +338,7 @@
           <a:p>
             <a:fld id="{073F35EF-A6EE-47AC-A495-9B6E931EEBD2}" type="datetimeFigureOut">
               <a:rPr lang="en-GB" smtClean="0"/>
-              <a:t>15/01/2025</a:t>
+              <a:t>17/01/2025</a:t>
             </a:fld>
             <a:endParaRPr lang="en-GB"/>
           </a:p>
@@ -615,7 +615,7 @@
           <a:p>
             <a:fld id="{073F35EF-A6EE-47AC-A495-9B6E931EEBD2}" type="datetimeFigureOut">
               <a:rPr lang="en-GB" smtClean="0"/>
-              <a:t>15/01/2025</a:t>
+              <a:t>17/01/2025</a:t>
             </a:fld>
             <a:endParaRPr lang="en-GB"/>
           </a:p>
@@ -872,7 +872,7 @@
           <a:p>
             <a:fld id="{073F35EF-A6EE-47AC-A495-9B6E931EEBD2}" type="datetimeFigureOut">
               <a:rPr lang="en-GB" smtClean="0"/>
-              <a:t>15/01/2025</a:t>
+              <a:t>17/01/2025</a:t>
             </a:fld>
             <a:endParaRPr lang="en-GB"/>
           </a:p>
@@ -1042,7 +1042,7 @@
           <a:p>
             <a:fld id="{073F35EF-A6EE-47AC-A495-9B6E931EEBD2}" type="datetimeFigureOut">
               <a:rPr lang="en-GB" smtClean="0"/>
-              <a:t>15/01/2025</a:t>
+              <a:t>17/01/2025</a:t>
             </a:fld>
             <a:endParaRPr lang="en-GB"/>
           </a:p>
@@ -1222,7 +1222,7 @@
           <a:p>
             <a:fld id="{073F35EF-A6EE-47AC-A495-9B6E931EEBD2}" type="datetimeFigureOut">
               <a:rPr lang="en-GB" smtClean="0"/>
-              <a:t>15/01/2025</a:t>
+              <a:t>17/01/2025</a:t>
             </a:fld>
             <a:endParaRPr lang="en-GB"/>
           </a:p>
@@ -1740,7 +1740,7 @@
           <a:p>
             <a:fld id="{073F35EF-A6EE-47AC-A495-9B6E931EEBD2}" type="datetimeFigureOut">
               <a:rPr lang="en-GB" smtClean="0"/>
-              <a:t>15/01/2025</a:t>
+              <a:t>17/01/2025</a:t>
             </a:fld>
             <a:endParaRPr lang="en-GB"/>
           </a:p>
@@ -1910,7 +1910,7 @@
           <a:p>
             <a:fld id="{073F35EF-A6EE-47AC-A495-9B6E931EEBD2}" type="datetimeFigureOut">
               <a:rPr lang="en-GB" smtClean="0"/>
-              <a:t>15/01/2025</a:t>
+              <a:t>17/01/2025</a:t>
             </a:fld>
             <a:endParaRPr lang="en-GB"/>
           </a:p>
@@ -2156,7 +2156,7 @@
           <a:p>
             <a:fld id="{073F35EF-A6EE-47AC-A495-9B6E931EEBD2}" type="datetimeFigureOut">
               <a:rPr lang="en-GB" smtClean="0"/>
-              <a:t>15/01/2025</a:t>
+              <a:t>17/01/2025</a:t>
             </a:fld>
             <a:endParaRPr lang="en-GB"/>
           </a:p>
@@ -2388,7 +2388,7 @@
           <a:p>
             <a:fld id="{073F35EF-A6EE-47AC-A495-9B6E931EEBD2}" type="datetimeFigureOut">
               <a:rPr lang="en-GB" smtClean="0"/>
-              <a:t>15/01/2025</a:t>
+              <a:t>17/01/2025</a:t>
             </a:fld>
             <a:endParaRPr lang="en-GB"/>
           </a:p>
@@ -2755,7 +2755,7 @@
           <a:p>
             <a:fld id="{073F35EF-A6EE-47AC-A495-9B6E931EEBD2}" type="datetimeFigureOut">
               <a:rPr lang="en-GB" smtClean="0"/>
-              <a:t>15/01/2025</a:t>
+              <a:t>17/01/2025</a:t>
             </a:fld>
             <a:endParaRPr lang="en-GB"/>
           </a:p>
@@ -2873,7 +2873,7 @@
           <a:p>
             <a:fld id="{073F35EF-A6EE-47AC-A495-9B6E931EEBD2}" type="datetimeFigureOut">
               <a:rPr lang="en-GB" smtClean="0"/>
-              <a:t>15/01/2025</a:t>
+              <a:t>17/01/2025</a:t>
             </a:fld>
             <a:endParaRPr lang="en-GB"/>
           </a:p>
@@ -3086,7 +3086,7 @@
           <a:p>
             <a:fld id="{073F35EF-A6EE-47AC-A495-9B6E931EEBD2}" type="datetimeFigureOut">
               <a:rPr lang="en-GB" smtClean="0"/>
-              <a:t>15/01/2025</a:t>
+              <a:t>17/01/2025</a:t>
             </a:fld>
             <a:endParaRPr lang="en-GB"/>
           </a:p>
@@ -4591,46 +4591,46 @@
           <a:lstStyle/>
           <a:p>
             <a:r>
+              <a:rPr lang="en-GB" dirty="0"/>
+              <a:t>Try not to leave interactive jobs idle</a:t>
+            </a:r>
+          </a:p>
+          <a:p>
+            <a:pPr lvl="1"/>
+            <a:r>
+              <a:rPr lang="en-GB" sz="1800" dirty="0"/>
+              <a:t>If job will take a long time detach </a:t>
+            </a:r>
+            <a:r>
+              <a:rPr lang="en-GB" sz="1800" dirty="0" err="1"/>
+              <a:t>tmux</a:t>
+            </a:r>
+            <a:r>
+              <a:rPr lang="en-GB" sz="1800" dirty="0"/>
+              <a:t> session and resume later</a:t>
+            </a:r>
+          </a:p>
+          <a:p>
+            <a:r>
               <a:rPr lang="en-GB" sz="2400" dirty="0"/>
-              <a:t>Try not to leave interactive jobs idle</a:t>
-            </a:r>
-          </a:p>
-          <a:p>
-            <a:pPr lvl="1"/>
-            <a:r>
-              <a:rPr lang="en-GB" sz="1600" dirty="0"/>
-              <a:t>If job will take a long time detach </a:t>
-            </a:r>
-            <a:r>
-              <a:rPr lang="en-GB" sz="1600" dirty="0" err="1"/>
+              <a:t>Try to keep </a:t>
+            </a:r>
+            <a:r>
+              <a:rPr lang="en-GB" sz="2400" dirty="0" err="1"/>
               <a:t>tmux</a:t>
             </a:r>
             <a:r>
-              <a:rPr lang="en-GB" sz="1600" dirty="0"/>
-              <a:t> session and resume later</a:t>
-            </a:r>
-          </a:p>
-          <a:p>
-            <a:r>
-              <a:rPr lang="en-GB" sz="2000" dirty="0"/>
-              <a:t>Try to keep </a:t>
-            </a:r>
-            <a:r>
-              <a:rPr lang="en-GB" sz="2000" dirty="0" err="1"/>
-              <a:t>tmux</a:t>
-            </a:r>
-            <a:r>
-              <a:rPr lang="en-GB" sz="2000" dirty="0"/>
+              <a:rPr lang="en-GB" sz="2400" dirty="0"/>
               <a:t> sessions, session specific close and start a new one for a new session</a:t>
             </a:r>
           </a:p>
           <a:p>
             <a:r>
-              <a:rPr lang="en-GB" sz="2000" dirty="0" err="1"/>
+              <a:rPr lang="en-GB" sz="2400" dirty="0" err="1"/>
               <a:t>Tmux</a:t>
             </a:r>
             <a:r>
-              <a:rPr lang="en-GB" sz="2000" dirty="0"/>
+              <a:rPr lang="en-GB" sz="2400" dirty="0"/>
               <a:t> is not infallible, and sessions can end unexpectedly especially if there is a problem with a login node</a:t>
             </a:r>
           </a:p>
@@ -4835,105 +4835,105 @@
           <a:lstStyle/>
           <a:p>
             <a:r>
-              <a:rPr lang="en-GB" sz="2000" dirty="0"/>
+              <a:rPr lang="en-GB" sz="2400" dirty="0"/>
               <a:t>Start a </a:t>
             </a:r>
             <a:r>
-              <a:rPr lang="en-GB" sz="2000" dirty="0" err="1"/>
+              <a:rPr lang="en-GB" sz="2400" dirty="0" err="1"/>
               <a:t>tmux</a:t>
             </a:r>
             <a:r>
-              <a:rPr lang="en-GB" sz="2000" dirty="0"/>
+              <a:rPr lang="en-GB" sz="2400" dirty="0"/>
               <a:t> session</a:t>
             </a:r>
           </a:p>
           <a:p>
             <a:r>
-              <a:rPr lang="en-GB" sz="2000" dirty="0"/>
+              <a:rPr lang="en-GB" sz="2400" dirty="0"/>
               <a:t>Split to 2 panes</a:t>
             </a:r>
           </a:p>
           <a:p>
             <a:r>
-              <a:rPr lang="en-GB" sz="2000" dirty="0"/>
+              <a:rPr lang="en-GB" sz="2400" dirty="0"/>
               <a:t>Start an interactive session in one of the panes:</a:t>
             </a:r>
           </a:p>
           <a:p>
             <a:pPr lvl="1"/>
             <a:r>
-              <a:rPr lang="en-GB" sz="1600" dirty="0"/>
+              <a:rPr lang="en-GB" sz="1800" dirty="0"/>
               <a:t>Interactive execution files:</a:t>
             </a:r>
           </a:p>
           <a:p>
             <a:pPr lvl="2"/>
             <a:r>
-              <a:rPr lang="en-GB" sz="1200" dirty="0"/>
+              <a:rPr lang="en-GB" sz="1400" dirty="0"/>
               <a:t>srun_rfi.sh and srun_diamond.sh</a:t>
             </a:r>
           </a:p>
           <a:p>
             <a:pPr lvl="2"/>
             <a:r>
-              <a:rPr lang="en-GB" sz="1200" dirty="0"/>
+              <a:rPr lang="en-GB" sz="1400" dirty="0"/>
               <a:t>Job is requesting 1 GPU and </a:t>
             </a:r>
             <a:r>
-              <a:rPr lang="en-GB" sz="1200" dirty="0" err="1"/>
+              <a:rPr lang="en-GB" sz="1400" dirty="0" err="1"/>
               <a:t>ntasks</a:t>
             </a:r>
             <a:r>
-              <a:rPr lang="en-GB" sz="1200" dirty="0"/>
+              <a:rPr lang="en-GB" sz="1400" dirty="0"/>
               <a:t>=36 over 1 node for 2 hours</a:t>
             </a:r>
           </a:p>
           <a:p>
             <a:pPr lvl="1"/>
             <a:r>
-              <a:rPr lang="en-GB" sz="1600" dirty="0"/>
+              <a:rPr lang="en-GB" sz="1800" dirty="0"/>
               <a:t>Can use commands found </a:t>
             </a:r>
             <a:r>
-              <a:rPr lang="en-GB" sz="1800" dirty="0">
+              <a:rPr lang="en-GB" sz="2000" dirty="0">
                 <a:hlinkClick r:id="rId2"/>
               </a:rPr>
               <a:t>https://docs.baskerville.ac.uk/interactive-jobs/</a:t>
             </a:r>
             <a:r>
-              <a:rPr lang="en-GB" sz="1800" dirty="0"/>
+              <a:rPr lang="en-GB" sz="2000" dirty="0"/>
               <a:t> - with reservation flag</a:t>
             </a:r>
           </a:p>
           <a:p>
             <a:pPr lvl="1"/>
             <a:r>
-              <a:rPr lang="en-GB" sz="1800" dirty="0"/>
+              <a:rPr lang="en-GB" sz="2000" dirty="0"/>
               <a:t>In the other pane ssh to the compute node and run:</a:t>
             </a:r>
           </a:p>
           <a:p>
             <a:pPr lvl="2"/>
             <a:r>
-              <a:rPr lang="en-GB" sz="1400" dirty="0"/>
+              <a:rPr lang="en-GB" sz="1600" dirty="0"/>
               <a:t>`</a:t>
             </a:r>
             <a:r>
-              <a:rPr lang="en-GB" sz="1400" dirty="0">
+              <a:rPr lang="en-GB" sz="1600" dirty="0">
                 <a:latin typeface="Courier New" panose="02070309020205020404" pitchFamily="49" charset="0"/>
                 <a:cs typeface="Courier New" panose="02070309020205020404" pitchFamily="49" charset="0"/>
               </a:rPr>
               <a:t>watch -n 1 </a:t>
             </a:r>
             <a:r>
-              <a:rPr lang="en-GB" sz="1400" dirty="0" err="1">
+              <a:rPr lang="en-GB" sz="1600" dirty="0" err="1">
                 <a:latin typeface="Courier New" panose="02070309020205020404" pitchFamily="49" charset="0"/>
                 <a:cs typeface="Courier New" panose="02070309020205020404" pitchFamily="49" charset="0"/>
               </a:rPr>
               <a:t>nvidia-smi</a:t>
             </a:r>
             <a:r>
-              <a:rPr lang="en-GB" sz="1400" dirty="0">
+              <a:rPr lang="en-GB" sz="1600" dirty="0">
                 <a:latin typeface="Courier New" panose="02070309020205020404" pitchFamily="49" charset="0"/>
                 <a:cs typeface="Courier New" panose="02070309020205020404" pitchFamily="49" charset="0"/>
               </a:rPr>
@@ -4942,7 +4942,7 @@
           </a:p>
           <a:p>
             <a:r>
-              <a:rPr lang="en-GB" sz="2200" dirty="0"/>
+              <a:rPr lang="en-GB" sz="2400" dirty="0"/>
               <a:t>Now on a compute node you can do the following tasks</a:t>
             </a:r>
           </a:p>
@@ -5806,250 +5806,6 @@
         <p:cNvPr id="1" name="">
           <a:extLst>
             <a:ext uri="{FF2B5EF4-FFF2-40B4-BE49-F238E27FC236}">
-              <a16:creationId xmlns:a16="http://schemas.microsoft.com/office/drawing/2014/main" id="{4C769C9F-890C-FDD8-DC17-413DBDF735A0}"/>
-            </a:ext>
-          </a:extLst>
-        </p:cNvPr>
-        <p:cNvGrpSpPr/>
-        <p:nvPr/>
-      </p:nvGrpSpPr>
-      <p:grpSpPr>
-        <a:xfrm>
-          <a:off x="0" y="0"/>
-          <a:ext cx="0" cy="0"/>
-          <a:chOff x="0" y="0"/>
-          <a:chExt cx="0" cy="0"/>
-        </a:xfrm>
-      </p:grpSpPr>
-      <p:sp>
-        <p:nvSpPr>
-          <p:cNvPr id="2" name="Title 1">
-            <a:extLst>
-              <a:ext uri="{FF2B5EF4-FFF2-40B4-BE49-F238E27FC236}">
-                <a16:creationId xmlns:a16="http://schemas.microsoft.com/office/drawing/2014/main" id="{F04C1407-5444-EB39-0322-1616A62EDB45}"/>
-              </a:ext>
-            </a:extLst>
-          </p:cNvPr>
-          <p:cNvSpPr>
-            <a:spLocks noGrp="1"/>
-          </p:cNvSpPr>
-          <p:nvPr>
-            <p:ph type="title"/>
-          </p:nvPr>
-        </p:nvSpPr>
-        <p:spPr/>
-        <p:txBody>
-          <a:bodyPr>
-            <a:normAutofit/>
-          </a:bodyPr>
-          <a:lstStyle/>
-          <a:p>
-            <a:r>
-              <a:rPr lang="en-GB" dirty="0"/>
-              <a:t>CUDA task – Compiling CUDA Bench</a:t>
-            </a:r>
-          </a:p>
-        </p:txBody>
-      </p:sp>
-      <p:sp>
-        <p:nvSpPr>
-          <p:cNvPr id="3" name="Content Placeholder 2">
-            <a:extLst>
-              <a:ext uri="{FF2B5EF4-FFF2-40B4-BE49-F238E27FC236}">
-                <a16:creationId xmlns:a16="http://schemas.microsoft.com/office/drawing/2014/main" id="{CA1F009A-51A4-8A17-0A37-4405B2F174D9}"/>
-              </a:ext>
-            </a:extLst>
-          </p:cNvPr>
-          <p:cNvSpPr>
-            <a:spLocks noGrp="1"/>
-          </p:cNvSpPr>
-          <p:nvPr>
-            <p:ph idx="1"/>
-          </p:nvPr>
-        </p:nvSpPr>
-        <p:spPr>
-          <a:xfrm>
-            <a:off x="529167" y="1484784"/>
-            <a:ext cx="10363200" cy="4325466"/>
-          </a:xfrm>
-        </p:spPr>
-        <p:txBody>
-          <a:bodyPr>
-            <a:noAutofit/>
-          </a:bodyPr>
-          <a:lstStyle/>
-          <a:p>
-            <a:r>
-              <a:rPr lang="en-GB" sz="2400" dirty="0"/>
-              <a:t>Module to load:</a:t>
-            </a:r>
-          </a:p>
-          <a:p>
-            <a:pPr lvl="1"/>
-            <a:r>
-              <a:rPr lang="en-GB" sz="2000" dirty="0"/>
-              <a:t>CUDA 12.1.1</a:t>
-            </a:r>
-          </a:p>
-          <a:p>
-            <a:pPr lvl="1"/>
-            <a:r>
-              <a:rPr lang="en-GB" sz="2000" dirty="0"/>
-              <a:t>NVHPC 23.7</a:t>
-            </a:r>
-          </a:p>
-          <a:p>
-            <a:pPr lvl="1"/>
-            <a:r>
-              <a:rPr lang="en-GB" sz="2000" dirty="0" err="1"/>
-              <a:t>CMake</a:t>
-            </a:r>
-            <a:r>
-              <a:rPr lang="en-GB" sz="2000" dirty="0"/>
-              <a:t> 3.26.3</a:t>
-            </a:r>
-          </a:p>
-          <a:p>
-            <a:r>
-              <a:rPr lang="en-GB" sz="2400" dirty="0"/>
-              <a:t>Build command - </a:t>
-            </a:r>
-            <a:r>
-              <a:rPr lang="en-GB" sz="2400" dirty="0" err="1"/>
-              <a:t>cmake</a:t>
-            </a:r>
-            <a:r>
-              <a:rPr lang="en-GB" sz="2400" dirty="0"/>
-              <a:t> -DBUILD_MODE=Release -DCMAKE_CUDA_ARCHITECTURES=80  ..</a:t>
-            </a:r>
-          </a:p>
-          <a:p>
-            <a:endParaRPr lang="en-GB" sz="2400" dirty="0"/>
-          </a:p>
-        </p:txBody>
-      </p:sp>
-      <p:grpSp>
-        <p:nvGrpSpPr>
-          <p:cNvPr id="4" name="Group 3">
-            <a:extLst>
-              <a:ext uri="{FF2B5EF4-FFF2-40B4-BE49-F238E27FC236}">
-                <a16:creationId xmlns:a16="http://schemas.microsoft.com/office/drawing/2014/main" id="{AC3D2D36-FDD1-9A47-42E9-623D3700C909}"/>
-              </a:ext>
-            </a:extLst>
-          </p:cNvPr>
-          <p:cNvGrpSpPr/>
-          <p:nvPr/>
-        </p:nvGrpSpPr>
-        <p:grpSpPr>
-          <a:xfrm>
-            <a:off x="4215988" y="5793696"/>
-            <a:ext cx="960359" cy="877088"/>
-            <a:chOff x="4215988" y="5793696"/>
-            <a:chExt cx="960359" cy="877088"/>
-          </a:xfrm>
-        </p:grpSpPr>
-        <p:pic>
-          <p:nvPicPr>
-            <p:cNvPr id="5" name="Picture 4" descr="A picture containing schematic&#10;&#10;Description automatically generated">
-              <a:extLst>
-                <a:ext uri="{FF2B5EF4-FFF2-40B4-BE49-F238E27FC236}">
-                  <a16:creationId xmlns:a16="http://schemas.microsoft.com/office/drawing/2014/main" id="{831EF874-55C3-2FA6-DDAD-6E61FB0AD971}"/>
-                </a:ext>
-              </a:extLst>
-            </p:cNvPr>
-            <p:cNvPicPr>
-              <a:picLocks noChangeAspect="1"/>
-            </p:cNvPicPr>
-            <p:nvPr/>
-          </p:nvPicPr>
-          <p:blipFill>
-            <a:blip r:embed="rId2" cstate="print">
-              <a:extLst>
-                <a:ext uri="{28A0092B-C50C-407E-A947-70E740481C1C}">
-                  <a14:useLocalDpi xmlns:a14="http://schemas.microsoft.com/office/drawing/2010/main" val="0"/>
-                </a:ext>
-              </a:extLst>
-            </a:blip>
-            <a:stretch>
-              <a:fillRect/>
-            </a:stretch>
-          </p:blipFill>
-          <p:spPr>
-            <a:xfrm>
-              <a:off x="4299259" y="5793696"/>
-              <a:ext cx="877088" cy="877088"/>
-            </a:xfrm>
-            <a:prstGeom prst="rect">
-              <a:avLst/>
-            </a:prstGeom>
-          </p:spPr>
-        </p:pic>
-        <p:cxnSp>
-          <p:nvCxnSpPr>
-            <p:cNvPr id="6" name="Straight Connector 5">
-              <a:extLst>
-                <a:ext uri="{FF2B5EF4-FFF2-40B4-BE49-F238E27FC236}">
-                  <a16:creationId xmlns:a16="http://schemas.microsoft.com/office/drawing/2014/main" id="{40A509E1-3BC4-6966-2CC6-FED5A378BE23}"/>
-                </a:ext>
-              </a:extLst>
-            </p:cNvPr>
-            <p:cNvCxnSpPr/>
-            <p:nvPr/>
-          </p:nvCxnSpPr>
-          <p:spPr>
-            <a:xfrm>
-              <a:off x="4215988" y="6033542"/>
-              <a:ext cx="0" cy="359764"/>
-            </a:xfrm>
-            <a:prstGeom prst="line">
-              <a:avLst/>
-            </a:prstGeom>
-            <a:ln>
-              <a:solidFill>
-                <a:schemeClr val="tx1">
-                  <a:lumMod val="75000"/>
-                  <a:lumOff val="25000"/>
-                </a:schemeClr>
-              </a:solidFill>
-            </a:ln>
-          </p:spPr>
-          <p:style>
-            <a:lnRef idx="2">
-              <a:schemeClr val="dk1"/>
-            </a:lnRef>
-            <a:fillRef idx="0">
-              <a:schemeClr val="dk1"/>
-            </a:fillRef>
-            <a:effectRef idx="1">
-              <a:schemeClr val="dk1"/>
-            </a:effectRef>
-            <a:fontRef idx="minor">
-              <a:schemeClr val="tx1"/>
-            </a:fontRef>
-          </p:style>
-        </p:cxnSp>
-      </p:grpSp>
-    </p:spTree>
-    <p:extLst>
-      <p:ext uri="{BB962C8B-B14F-4D97-AF65-F5344CB8AC3E}">
-        <p14:creationId xmlns:p14="http://schemas.microsoft.com/office/powerpoint/2010/main" val="50004006"/>
-      </p:ext>
-    </p:extLst>
-  </p:cSld>
-  <p:clrMapOvr>
-    <a:masterClrMapping/>
-  </p:clrMapOvr>
-</p:sld>
-</file>
-
-<file path=ppt/slides/slide18.xml><?xml version="1.0" encoding="utf-8"?>
-<p:sld xmlns:a="http://schemas.openxmlformats.org/drawingml/2006/main" xmlns:r="http://schemas.openxmlformats.org/officeDocument/2006/relationships" xmlns:p="http://schemas.openxmlformats.org/presentationml/2006/main">
-  <p:cSld>
-    <p:spTree>
-      <p:nvGrpSpPr>
-        <p:cNvPr id="1" name="">
-          <a:extLst>
-            <a:ext uri="{FF2B5EF4-FFF2-40B4-BE49-F238E27FC236}">
               <a16:creationId xmlns:a16="http://schemas.microsoft.com/office/drawing/2014/main" id="{D9CBDE76-AB6E-0BC0-FDC8-743CA6D17ED3}"/>
             </a:ext>
           </a:extLst>
@@ -6312,7 +6068,7 @@
 </p:sld>
 </file>
 
-<file path=ppt/slides/slide19.xml><?xml version="1.0" encoding="utf-8"?>
+<file path=ppt/slides/slide18.xml><?xml version="1.0" encoding="utf-8"?>
 <p:sld xmlns:a="http://schemas.openxmlformats.org/drawingml/2006/main" xmlns:r="http://schemas.openxmlformats.org/officeDocument/2006/relationships" xmlns:p="http://schemas.openxmlformats.org/presentationml/2006/main">
   <p:cSld>
     <p:spTree>
@@ -6568,6 +6324,247 @@
     <p:extLst>
       <p:ext uri="{BB962C8B-B14F-4D97-AF65-F5344CB8AC3E}">
         <p14:creationId xmlns:p14="http://schemas.microsoft.com/office/powerpoint/2010/main" val="3843070942"/>
+      </p:ext>
+    </p:extLst>
+  </p:cSld>
+  <p:clrMapOvr>
+    <a:masterClrMapping/>
+  </p:clrMapOvr>
+</p:sld>
+</file>
+
+<file path=ppt/slides/slide19.xml><?xml version="1.0" encoding="utf-8"?>
+<p:sld xmlns:a="http://schemas.openxmlformats.org/drawingml/2006/main" xmlns:r="http://schemas.openxmlformats.org/officeDocument/2006/relationships" xmlns:p="http://schemas.openxmlformats.org/presentationml/2006/main">
+  <p:cSld>
+    <p:spTree>
+      <p:nvGrpSpPr>
+        <p:cNvPr id="1" name="">
+          <a:extLst>
+            <a:ext uri="{FF2B5EF4-FFF2-40B4-BE49-F238E27FC236}">
+              <a16:creationId xmlns:a16="http://schemas.microsoft.com/office/drawing/2014/main" id="{4C769C9F-890C-FDD8-DC17-413DBDF735A0}"/>
+            </a:ext>
+          </a:extLst>
+        </p:cNvPr>
+        <p:cNvGrpSpPr/>
+        <p:nvPr/>
+      </p:nvGrpSpPr>
+      <p:grpSpPr>
+        <a:xfrm>
+          <a:off x="0" y="0"/>
+          <a:ext cx="0" cy="0"/>
+          <a:chOff x="0" y="0"/>
+          <a:chExt cx="0" cy="0"/>
+        </a:xfrm>
+      </p:grpSpPr>
+      <p:sp>
+        <p:nvSpPr>
+          <p:cNvPr id="2" name="Title 1">
+            <a:extLst>
+              <a:ext uri="{FF2B5EF4-FFF2-40B4-BE49-F238E27FC236}">
+                <a16:creationId xmlns:a16="http://schemas.microsoft.com/office/drawing/2014/main" id="{F04C1407-5444-EB39-0322-1616A62EDB45}"/>
+              </a:ext>
+            </a:extLst>
+          </p:cNvPr>
+          <p:cNvSpPr>
+            <a:spLocks noGrp="1"/>
+          </p:cNvSpPr>
+          <p:nvPr>
+            <p:ph type="title"/>
+          </p:nvPr>
+        </p:nvSpPr>
+        <p:spPr/>
+        <p:txBody>
+          <a:bodyPr>
+            <a:normAutofit/>
+          </a:bodyPr>
+          <a:lstStyle/>
+          <a:p>
+            <a:r>
+              <a:rPr lang="en-GB" dirty="0"/>
+              <a:t>CUDA task – Compiling CUDA Bench</a:t>
+            </a:r>
+          </a:p>
+        </p:txBody>
+      </p:sp>
+      <p:sp>
+        <p:nvSpPr>
+          <p:cNvPr id="3" name="Content Placeholder 2">
+            <a:extLst>
+              <a:ext uri="{FF2B5EF4-FFF2-40B4-BE49-F238E27FC236}">
+                <a16:creationId xmlns:a16="http://schemas.microsoft.com/office/drawing/2014/main" id="{CA1F009A-51A4-8A17-0A37-4405B2F174D9}"/>
+              </a:ext>
+            </a:extLst>
+          </p:cNvPr>
+          <p:cNvSpPr>
+            <a:spLocks noGrp="1"/>
+          </p:cNvSpPr>
+          <p:nvPr>
+            <p:ph idx="1"/>
+          </p:nvPr>
+        </p:nvSpPr>
+        <p:spPr>
+          <a:xfrm>
+            <a:off x="529167" y="1484784"/>
+            <a:ext cx="10363200" cy="4325466"/>
+          </a:xfrm>
+        </p:spPr>
+        <p:txBody>
+          <a:bodyPr>
+            <a:noAutofit/>
+          </a:bodyPr>
+          <a:lstStyle/>
+          <a:p>
+            <a:r>
+              <a:rPr lang="en-GB" sz="2400" dirty="0"/>
+              <a:t>Module to load:</a:t>
+            </a:r>
+          </a:p>
+          <a:p>
+            <a:pPr lvl="1"/>
+            <a:r>
+              <a:rPr lang="en-GB" sz="2000" dirty="0"/>
+              <a:t>CUDA 12.1.1</a:t>
+            </a:r>
+          </a:p>
+          <a:p>
+            <a:pPr lvl="1"/>
+            <a:r>
+              <a:rPr lang="en-GB" sz="2000" dirty="0"/>
+              <a:t>NVHPC 23.7</a:t>
+            </a:r>
+          </a:p>
+          <a:p>
+            <a:pPr lvl="1"/>
+            <a:r>
+              <a:rPr lang="en-GB" sz="2000" dirty="0" err="1"/>
+              <a:t>CMake</a:t>
+            </a:r>
+            <a:r>
+              <a:rPr lang="en-GB" sz="2000" dirty="0"/>
+              <a:t> 3.26.3</a:t>
+            </a:r>
+          </a:p>
+          <a:p>
+            <a:r>
+              <a:rPr lang="en-GB" sz="2400" dirty="0"/>
+              <a:t>Build command - </a:t>
+            </a:r>
+            <a:r>
+              <a:rPr lang="en-GB" sz="2400" dirty="0" err="1"/>
+              <a:t>cmake</a:t>
+            </a:r>
+            <a:r>
+              <a:rPr lang="en-GB" sz="2400" dirty="0"/>
+              <a:t> -DBUILD_MODE=Release</a:t>
+            </a:r>
+          </a:p>
+        </p:txBody>
+      </p:sp>
+      <p:grpSp>
+        <p:nvGrpSpPr>
+          <p:cNvPr id="4" name="Group 3">
+            <a:extLst>
+              <a:ext uri="{FF2B5EF4-FFF2-40B4-BE49-F238E27FC236}">
+                <a16:creationId xmlns:a16="http://schemas.microsoft.com/office/drawing/2014/main" id="{AC3D2D36-FDD1-9A47-42E9-623D3700C909}"/>
+              </a:ext>
+            </a:extLst>
+          </p:cNvPr>
+          <p:cNvGrpSpPr/>
+          <p:nvPr/>
+        </p:nvGrpSpPr>
+        <p:grpSpPr>
+          <a:xfrm>
+            <a:off x="4215988" y="5793696"/>
+            <a:ext cx="960359" cy="877088"/>
+            <a:chOff x="4215988" y="5793696"/>
+            <a:chExt cx="960359" cy="877088"/>
+          </a:xfrm>
+        </p:grpSpPr>
+        <p:pic>
+          <p:nvPicPr>
+            <p:cNvPr id="5" name="Picture 4" descr="A picture containing schematic&#10;&#10;Description automatically generated">
+              <a:extLst>
+                <a:ext uri="{FF2B5EF4-FFF2-40B4-BE49-F238E27FC236}">
+                  <a16:creationId xmlns:a16="http://schemas.microsoft.com/office/drawing/2014/main" id="{831EF874-55C3-2FA6-DDAD-6E61FB0AD971}"/>
+                </a:ext>
+              </a:extLst>
+            </p:cNvPr>
+            <p:cNvPicPr>
+              <a:picLocks noChangeAspect="1"/>
+            </p:cNvPicPr>
+            <p:nvPr/>
+          </p:nvPicPr>
+          <p:blipFill>
+            <a:blip r:embed="rId2" cstate="print">
+              <a:extLst>
+                <a:ext uri="{28A0092B-C50C-407E-A947-70E740481C1C}">
+                  <a14:useLocalDpi xmlns:a14="http://schemas.microsoft.com/office/drawing/2010/main" val="0"/>
+                </a:ext>
+              </a:extLst>
+            </a:blip>
+            <a:stretch>
+              <a:fillRect/>
+            </a:stretch>
+          </p:blipFill>
+          <p:spPr>
+            <a:xfrm>
+              <a:off x="4299259" y="5793696"/>
+              <a:ext cx="877088" cy="877088"/>
+            </a:xfrm>
+            <a:prstGeom prst="rect">
+              <a:avLst/>
+            </a:prstGeom>
+          </p:spPr>
+        </p:pic>
+        <p:cxnSp>
+          <p:nvCxnSpPr>
+            <p:cNvPr id="6" name="Straight Connector 5">
+              <a:extLst>
+                <a:ext uri="{FF2B5EF4-FFF2-40B4-BE49-F238E27FC236}">
+                  <a16:creationId xmlns:a16="http://schemas.microsoft.com/office/drawing/2014/main" id="{40A509E1-3BC4-6966-2CC6-FED5A378BE23}"/>
+                </a:ext>
+              </a:extLst>
+            </p:cNvPr>
+            <p:cNvCxnSpPr/>
+            <p:nvPr/>
+          </p:nvCxnSpPr>
+          <p:spPr>
+            <a:xfrm>
+              <a:off x="4215988" y="6033542"/>
+              <a:ext cx="0" cy="359764"/>
+            </a:xfrm>
+            <a:prstGeom prst="line">
+              <a:avLst/>
+            </a:prstGeom>
+            <a:ln>
+              <a:solidFill>
+                <a:schemeClr val="tx1">
+                  <a:lumMod val="75000"/>
+                  <a:lumOff val="25000"/>
+                </a:schemeClr>
+              </a:solidFill>
+            </a:ln>
+          </p:spPr>
+          <p:style>
+            <a:lnRef idx="2">
+              <a:schemeClr val="dk1"/>
+            </a:lnRef>
+            <a:fillRef idx="0">
+              <a:schemeClr val="dk1"/>
+            </a:fillRef>
+            <a:effectRef idx="1">
+              <a:schemeClr val="dk1"/>
+            </a:effectRef>
+            <a:fontRef idx="minor">
+              <a:schemeClr val="tx1"/>
+            </a:fontRef>
+          </p:style>
+        </p:cxnSp>
+      </p:grpSp>
+    </p:spTree>
+    <p:extLst>
+      <p:ext uri="{BB962C8B-B14F-4D97-AF65-F5344CB8AC3E}">
+        <p14:creationId xmlns:p14="http://schemas.microsoft.com/office/powerpoint/2010/main" val="50004006"/>
       </p:ext>
     </p:extLst>
   </p:cSld>
@@ -12705,18 +12702,18 @@
 </file>
 
 <file path=customXml/item2.xml><?xml version="1.0" encoding="utf-8"?>
+<p:properties xmlns:p="http://schemas.microsoft.com/office/2006/metadata/properties" xmlns:xsi="http://www.w3.org/2001/XMLSchema-instance" xmlns:pc="http://schemas.microsoft.com/office/infopath/2007/PartnerControls">
+  <documentManagement/>
+</p:properties>
+</file>
+
+<file path=customXml/item3.xml><?xml version="1.0" encoding="utf-8"?>
 <?mso-contentType ?>
 <FormTemplates xmlns="http://schemas.microsoft.com/sharepoint/v3/contenttype/forms">
   <Display>DocumentLibraryForm</Display>
   <Edit>DocumentLibraryForm</Edit>
   <New>DocumentLibraryForm</New>
 </FormTemplates>
-</file>
-
-<file path=customXml/item3.xml><?xml version="1.0" encoding="utf-8"?>
-<p:properties xmlns:p="http://schemas.microsoft.com/office/2006/metadata/properties" xmlns:xsi="http://www.w3.org/2001/XMLSchema-instance" xmlns:pc="http://schemas.microsoft.com/office/infopath/2007/PartnerControls">
-  <documentManagement/>
-</p:properties>
 </file>
 
 <file path=customXml/itemProps1.xml><?xml version="1.0" encoding="utf-8"?>
@@ -12739,14 +12736,6 @@
 </file>
 
 <file path=customXml/itemProps2.xml><?xml version="1.0" encoding="utf-8"?>
-<ds:datastoreItem xmlns:ds="http://schemas.openxmlformats.org/officeDocument/2006/customXml" ds:itemID="{01C33FEC-652C-4516-A579-CBB40620CA04}">
-  <ds:schemaRefs>
-    <ds:schemaRef ds:uri="http://schemas.microsoft.com/sharepoint/v3/contenttype/forms"/>
-  </ds:schemaRefs>
-</ds:datastoreItem>
-</file>
-
-<file path=customXml/itemProps3.xml><?xml version="1.0" encoding="utf-8"?>
 <ds:datastoreItem xmlns:ds="http://schemas.openxmlformats.org/officeDocument/2006/customXml" ds:itemID="{0A3731A9-97AF-4DDB-A94A-9053EAA7AAD3}">
   <ds:schemaRefs>
     <ds:schemaRef ds:uri="http://purl.org/dc/terms/"/>
@@ -12760,4 +12749,12 @@
     <ds:schemaRef ds:uri="http://purl.org/dc/elements/1.1/"/>
   </ds:schemaRefs>
 </ds:datastoreItem>
+</file>
+
+<file path=customXml/itemProps3.xml><?xml version="1.0" encoding="utf-8"?>
+<ds:datastoreItem xmlns:ds="http://schemas.openxmlformats.org/officeDocument/2006/customXml" ds:itemID="{01C33FEC-652C-4516-A579-CBB40620CA04}">
+  <ds:schemaRefs>
+    <ds:schemaRef ds:uri="http://schemas.microsoft.com/sharepoint/v3/contenttype/forms"/>
+  </ds:schemaRefs>
+</ds:datastoreItem>
 </file>
</xml_diff>